<commit_message>
updated, save PDF too
</commit_message>
<xml_diff>
--- a/Slides/PSP-2.pptx
+++ b/Slides/PSP-2.pptx
@@ -11837,22 +11837,19 @@
               <a:rPr lang="en-US" sz="2000" dirty="0" smtClean="0">
                 <a:cs typeface="+mn-cs"/>
               </a:rPr>
+              <a:t>Budget spent ~every time you win a slice of an auction, need to reset/adjust periodically, to keep the bidders solvent</a:t>
+            </a:r>
+          </a:p>
+          <a:p>
+            <a:pPr lvl="2" eaLnBrk="1" hangingPunct="1">
+              <a:defRPr/>
+            </a:pPr>
+            <a:r>
+              <a:rPr lang="en-US" sz="2000" dirty="0" smtClean="0">
+                <a:cs typeface="+mn-cs"/>
+              </a:rPr>
               <a:t>Similar problem to allocating batch quota on shared farms?</a:t>
             </a:r>
-          </a:p>
-          <a:p>
-            <a:pPr lvl="2" eaLnBrk="1" hangingPunct="1">
-              <a:defRPr/>
-            </a:pPr>
-            <a:r>
-              <a:rPr lang="en-US" sz="2000" dirty="0" smtClean="0">
-                <a:cs typeface="+mn-cs"/>
-              </a:rPr>
-              <a:t>Budget spent ~every time you win a slice of an auction, need to reset/adjust periodically, to keep the bidders solvent</a:t>
-            </a:r>
-            <a:endParaRPr lang="en-US" sz="2000" dirty="0" smtClean="0">
-              <a:cs typeface="+mn-cs"/>
-            </a:endParaRPr>
           </a:p>
         </p:txBody>
       </p:sp>
@@ -12098,7 +12095,19 @@
               <a:rPr lang="en-US" sz="2400" dirty="0" smtClean="0">
                 <a:cs typeface="+mn-cs"/>
               </a:rPr>
-              <a:t>Ensure adjustment don’t destroy auction fairness</a:t>
+              <a:t>Budget adjustment </a:t>
+            </a:r>
+            <a:r>
+              <a:rPr lang="en-US" sz="2400" dirty="0" err="1" smtClean="0">
+                <a:cs typeface="+mn-cs"/>
+              </a:rPr>
+              <a:t>musn’t</a:t>
+            </a:r>
+            <a:r>
+              <a:rPr lang="en-US" sz="2400" dirty="0" smtClean="0">
+                <a:cs typeface="+mn-cs"/>
+              </a:rPr>
+              <a:t> destroy auction fairness</a:t>
             </a:r>
             <a:endParaRPr lang="en-US" sz="2400" dirty="0" smtClean="0">
               <a:cs typeface="+mn-cs"/>
@@ -12350,7 +12359,7 @@
               <a:rPr lang="en-US" sz="2000" dirty="0" smtClean="0">
                 <a:cs typeface="+mn-cs"/>
               </a:rPr>
-              <a:t>No offline negotiations between experiments &amp; network providers</a:t>
+              <a:t>No negotiations between experiments &amp; network providers</a:t>
             </a:r>
             <a:endParaRPr lang="en-US" sz="2000" dirty="0" smtClean="0">
               <a:cs typeface="+mn-cs"/>
@@ -12603,16 +12612,10 @@
               <a:defRPr/>
             </a:pPr>
             <a:r>
-              <a:rPr lang="en-US" sz="2400" smtClean="0">
-                <a:cs typeface="+mn-cs"/>
-              </a:rPr>
-              <a:t>Need </a:t>
-            </a:r>
-            <a:r>
               <a:rPr lang="en-US" sz="2400" dirty="0" smtClean="0">
                 <a:cs typeface="+mn-cs"/>
               </a:rPr>
-              <a:t>to understand how budget allocation interacts with bidding strategy to keep the auction truthful</a:t>
+              <a:t>Need to understand how budget allocation interacts with bidding strategy to keep the auction truthful</a:t>
             </a:r>
             <a:endParaRPr lang="en-US" sz="2400" dirty="0" smtClean="0">
               <a:cs typeface="+mn-cs"/>
@@ -13322,7 +13325,13 @@
               <a:rPr lang="en-US" sz="3600" dirty="0" smtClean="0">
                 <a:cs typeface="+mj-cs"/>
               </a:rPr>
-              <a:t>How?</a:t>
+              <a:t>Schedule, but h</a:t>
+            </a:r>
+            <a:r>
+              <a:rPr lang="en-US" sz="3600" dirty="0" smtClean="0">
+                <a:cs typeface="+mj-cs"/>
+              </a:rPr>
+              <a:t>ow?</a:t>
             </a:r>
             <a:endParaRPr lang="en-US" sz="3600" dirty="0" smtClean="0">
               <a:cs typeface="+mj-cs"/>
@@ -13691,6 +13700,17 @@
             </a:r>
           </a:p>
           <a:p>
+            <a:pPr lvl="1" eaLnBrk="1" hangingPunct="1">
+              <a:defRPr/>
+            </a:pPr>
+            <a:r>
+              <a:rPr lang="en-US" sz="2400" dirty="0" smtClean="0">
+                <a:cs typeface="+mn-cs"/>
+              </a:rPr>
+              <a:t>Participation not mandatory (casual or low-load users)</a:t>
+            </a:r>
+          </a:p>
+          <a:p>
             <a:pPr eaLnBrk="1" hangingPunct="1">
               <a:defRPr/>
             </a:pPr>
@@ -13698,7 +13718,13 @@
               <a:rPr lang="en-US" sz="2800" dirty="0" smtClean="0">
                 <a:cs typeface="+mn-cs"/>
               </a:rPr>
-              <a:t>Elastic, responsive</a:t>
+              <a:t>Elastic</a:t>
+            </a:r>
+            <a:r>
+              <a:rPr lang="en-US" sz="2800" dirty="0" smtClean="0">
+                <a:cs typeface="+mn-cs"/>
+              </a:rPr>
+              <a:t>, responsive</a:t>
             </a:r>
           </a:p>
           <a:p>
@@ -13746,35 +13772,6 @@
                 <a:cs typeface="+mn-cs"/>
               </a:rPr>
               <a:t>Allows maximal use of bandwidth at all times</a:t>
-            </a:r>
-          </a:p>
-          <a:p>
-            <a:pPr lvl="1" eaLnBrk="1" hangingPunct="1">
-              <a:defRPr/>
-            </a:pPr>
-            <a:r>
-              <a:rPr lang="en-US" sz="2400" dirty="0">
-                <a:cs typeface="+mn-cs"/>
-              </a:rPr>
-              <a:t>P</a:t>
-            </a:r>
-            <a:r>
-              <a:rPr lang="en-US" sz="2400" dirty="0" smtClean="0">
-                <a:cs typeface="+mn-cs"/>
-              </a:rPr>
-              <a:t>articipation not mandatory (casual </a:t>
-            </a:r>
-            <a:r>
-              <a:rPr lang="en-US" sz="2400" dirty="0">
-                <a:cs typeface="+mn-cs"/>
-              </a:rPr>
-              <a:t>o</a:t>
-            </a:r>
-            <a:r>
-              <a:rPr lang="en-US" sz="2400" dirty="0" smtClean="0">
-                <a:cs typeface="+mn-cs"/>
-              </a:rPr>
-              <a:t>r low-load users)</a:t>
             </a:r>
           </a:p>
           <a:p>

</xml_diff>